<commit_message>
Add week 2 lecture clean-up video.
</commit_message>
<xml_diff>
--- a/CPSC-24500/Week02/2017SpringW02SlidesLecture.pptx
+++ b/CPSC-24500/Week02/2017SpringW02SlidesLecture.pptx
@@ -5,10 +5,10 @@
     <p:sldMasterId id="2147483648" r:id="rId4"/>
   </p:sldMasterIdLst>
   <p:notesMasterIdLst>
-    <p:notesMasterId r:id="rId22"/>
+    <p:notesMasterId r:id="rId23"/>
   </p:notesMasterIdLst>
   <p:sldIdLst>
-    <p:sldId id="330" r:id="rId5"/>
+    <p:sldId id="363" r:id="rId5"/>
     <p:sldId id="289" r:id="rId6"/>
     <p:sldId id="359" r:id="rId7"/>
     <p:sldId id="356" r:id="rId8"/>
@@ -24,7 +24,8 @@
     <p:sldId id="340" r:id="rId18"/>
     <p:sldId id="360" r:id="rId19"/>
     <p:sldId id="361" r:id="rId20"/>
-    <p:sldId id="357" r:id="rId21"/>
+    <p:sldId id="362" r:id="rId21"/>
+    <p:sldId id="357" r:id="rId22"/>
   </p:sldIdLst>
   <p:sldSz cx="12192000" cy="6858000"/>
   <p:notesSz cx="7315200" cy="9601200"/>
@@ -216,7 +217,7 @@
           <a:p>
             <a:fld id="{91ED72D7-FE6F-4B82-8D31-76BC00B06094}" type="datetimeFigureOut">
               <a:rPr lang="en-US" smtClean="0"/>
-              <a:t>3/27/2017</a:t>
+              <a:t>3/28/2017</a:t>
             </a:fld>
             <a:endParaRPr lang="en-US"/>
           </a:p>
@@ -527,7 +528,19 @@
           <a:bodyPr/>
           <a:lstStyle/>
           <a:p>
-            <a:endParaRPr lang="en-US" dirty="0"/>
+            <a:r>
+              <a:rPr lang="en-US" sz="1000" dirty="0"/>
+              <a:t>While everyone is getting logged in an set up for our virtual discussion, I wanted to thank those of you who have posted their background and/or responded to other people’s discussion board posting. I have enjoyed reading through your comments. </a:t>
+            </a:r>
+          </a:p>
+          <a:p>
+            <a:endParaRPr lang="en-US" sz="1000" dirty="0"/>
+          </a:p>
+          <a:p>
+            <a:r>
+              <a:rPr lang="en-US" sz="1000" dirty="0"/>
+              <a:t>I am going to stat recording so that other can watch later; however, if I think that is impacting our ability to have a good discussion, I will stop the recording and just send out notes later.</a:t>
+            </a:r>
           </a:p>
         </p:txBody>
       </p:sp>
@@ -550,14 +563,14 @@
               <a:rPr lang="en-US" smtClean="0"/>
               <a:t>1</a:t>
             </a:fld>
-            <a:endParaRPr lang="en-US"/>
+            <a:endParaRPr lang="en-US" dirty="0"/>
           </a:p>
         </p:txBody>
       </p:sp>
     </p:spTree>
     <p:extLst>
       <p:ext uri="{BB962C8B-B14F-4D97-AF65-F5344CB8AC3E}">
-        <p14:creationId xmlns:p14="http://schemas.microsoft.com/office/powerpoint/2010/main" val="2654488227"/>
+        <p14:creationId xmlns:p14="http://schemas.microsoft.com/office/powerpoint/2010/main" val="3926305371"/>
       </p:ext>
     </p:extLst>
   </p:cSld>
@@ -1532,12 +1545,18 @@
           <a:lstStyle/>
           <a:p>
             <a:r>
+              <a:rPr lang="en-US" sz="1000" u="none" dirty="0"/>
+              <a:t>Below are some conversation that I took from various Internet sources related to calling methods from Constructors. Many organizations shy away from doing “complex” or “dangerous” things in Constructors. Consider how we would recover from a failed command in a constructor… recall that by definition it has not return value.</a:t>
+            </a:r>
+          </a:p>
+          <a:p>
+            <a:endParaRPr lang="en-US" sz="1000" u="none" dirty="0"/>
+          </a:p>
+          <a:p>
+            <a:r>
               <a:rPr lang="en-US" sz="1000" u="sng" dirty="0"/>
-              <a:t>Internet sources: </a:t>
-            </a:r>
-          </a:p>
-          <a:p>
-            <a:endParaRPr lang="en-US" sz="1000" dirty="0"/>
+              <a:t>Below are some quote from various Internet sources: </a:t>
+            </a:r>
           </a:p>
           <a:p>
             <a:r>
@@ -1558,170 +1577,7 @@
           </a:p>
           <a:p>
             <a:r>
-              <a:rPr lang="en-US" sz="1200" b="0" i="0" kern="1200" dirty="0">
-                <a:solidFill>
-                  <a:schemeClr val="tx1"/>
-                </a:solidFill>
-                <a:effectLst/>
-                <a:latin typeface="+mn-lt"/>
-                <a:ea typeface="+mn-ea"/>
-                <a:cs typeface="+mn-cs"/>
-              </a:rPr>
-              <a:t>Calling Methods from a Constructor</a:t>
-            </a:r>
-          </a:p>
-          <a:p>
-            <a:r>
-              <a:rPr lang="en-US" sz="1200" b="0" i="0" kern="1200" dirty="0">
-                <a:solidFill>
-                  <a:schemeClr val="tx1"/>
-                </a:solidFill>
-                <a:effectLst/>
-                <a:latin typeface="+mn-lt"/>
-                <a:ea typeface="+mn-ea"/>
-                <a:cs typeface="+mn-cs"/>
-              </a:rPr>
-              <a:t>In my opinion, we should try to only call either private or final methods from inside our constructors. The reason is that Java always calls the most derived method, which means we could call a method on a half-initialized object. Look at Newsletters </a:t>
-            </a:r>
-            <a:r>
-              <a:rPr lang="en-US" sz="1200" b="0" i="0" u="none" strike="noStrike" kern="1200" dirty="0">
-                <a:solidFill>
-                  <a:schemeClr val="tx1"/>
-                </a:solidFill>
-                <a:effectLst/>
-                <a:latin typeface="+mn-lt"/>
-                <a:ea typeface="+mn-ea"/>
-                <a:cs typeface="+mn-cs"/>
-                <a:hlinkClick r:id="rId3"/>
-              </a:rPr>
-              <a:t>086</a:t>
-            </a:r>
-            <a:r>
-              <a:rPr lang="en-US" sz="1200" b="0" i="0" kern="1200" dirty="0">
-                <a:solidFill>
-                  <a:schemeClr val="tx1"/>
-                </a:solidFill>
-                <a:effectLst/>
-                <a:latin typeface="+mn-lt"/>
-                <a:ea typeface="+mn-ea"/>
-                <a:cs typeface="+mn-cs"/>
-              </a:rPr>
-              <a:t> and </a:t>
-            </a:r>
-            <a:r>
-              <a:rPr lang="en-US" sz="1200" b="0" i="0" u="none" strike="noStrike" kern="1200" dirty="0">
-                <a:solidFill>
-                  <a:schemeClr val="tx1"/>
-                </a:solidFill>
-                <a:effectLst/>
-                <a:latin typeface="+mn-lt"/>
-                <a:ea typeface="+mn-ea"/>
-                <a:cs typeface="+mn-cs"/>
-                <a:hlinkClick r:id="rId4"/>
-              </a:rPr>
-              <a:t>086b</a:t>
-            </a:r>
-            <a:r>
-              <a:rPr lang="en-US" sz="1200" b="0" i="0" kern="1200" dirty="0">
-                <a:solidFill>
-                  <a:schemeClr val="tx1"/>
-                </a:solidFill>
-                <a:effectLst/>
-                <a:latin typeface="+mn-lt"/>
-                <a:ea typeface="+mn-ea"/>
-                <a:cs typeface="+mn-cs"/>
-              </a:rPr>
-              <a:t> for a workaround involving </a:t>
-            </a:r>
-            <a:r>
-              <a:rPr lang="en-US" sz="1200" b="0" i="0" kern="1200" dirty="0" err="1">
-                <a:solidFill>
-                  <a:schemeClr val="tx1"/>
-                </a:solidFill>
-                <a:effectLst/>
-                <a:latin typeface="+mn-lt"/>
-                <a:ea typeface="+mn-ea"/>
-                <a:cs typeface="+mn-cs"/>
-              </a:rPr>
-              <a:t>ThreadLocal</a:t>
-            </a:r>
-            <a:r>
-              <a:rPr lang="en-US" sz="1200" b="0" i="0" kern="1200" dirty="0">
-                <a:solidFill>
-                  <a:schemeClr val="tx1"/>
-                </a:solidFill>
-                <a:effectLst/>
-                <a:latin typeface="+mn-lt"/>
-                <a:ea typeface="+mn-ea"/>
-                <a:cs typeface="+mn-cs"/>
-              </a:rPr>
-              <a:t> and a call to a static method. As discussed already in newsletters </a:t>
-            </a:r>
-            <a:r>
-              <a:rPr lang="en-US" sz="1200" b="0" i="0" u="none" strike="noStrike" kern="1200" dirty="0">
-                <a:solidFill>
-                  <a:schemeClr val="tx1"/>
-                </a:solidFill>
-                <a:effectLst/>
-                <a:latin typeface="+mn-lt"/>
-                <a:ea typeface="+mn-ea"/>
-                <a:cs typeface="+mn-cs"/>
-                <a:hlinkClick r:id="rId5"/>
-              </a:rPr>
-              <a:t>062</a:t>
-            </a:r>
-            <a:r>
-              <a:rPr lang="en-US" sz="1200" b="0" i="0" kern="1200" dirty="0">
-                <a:solidFill>
-                  <a:schemeClr val="tx1"/>
-                </a:solidFill>
-                <a:effectLst/>
-                <a:latin typeface="+mn-lt"/>
-                <a:ea typeface="+mn-ea"/>
-                <a:cs typeface="+mn-cs"/>
-              </a:rPr>
-              <a:t> and </a:t>
-            </a:r>
-            <a:r>
-              <a:rPr lang="en-US" sz="1200" b="0" i="0" u="none" strike="noStrike" kern="1200" dirty="0">
-                <a:solidFill>
-                  <a:schemeClr val="tx1"/>
-                </a:solidFill>
-                <a:effectLst/>
-                <a:latin typeface="+mn-lt"/>
-                <a:ea typeface="+mn-ea"/>
-                <a:cs typeface="+mn-cs"/>
-                <a:hlinkClick r:id="rId6"/>
-              </a:rPr>
-              <a:t>062b</a:t>
-            </a:r>
-            <a:r>
-              <a:rPr lang="en-US" sz="1200" b="0" i="0" kern="1200" dirty="0">
-                <a:solidFill>
-                  <a:schemeClr val="tx1"/>
-                </a:solidFill>
-                <a:effectLst/>
-                <a:latin typeface="+mn-lt"/>
-                <a:ea typeface="+mn-ea"/>
-                <a:cs typeface="+mn-cs"/>
-              </a:rPr>
-              <a:t>, calling methods from an object's constructor could cause particular issues with inner classes.</a:t>
-            </a:r>
-          </a:p>
-          <a:p>
-            <a:endParaRPr lang="en-US" sz="1200" b="0" i="0" kern="1200" dirty="0">
-              <a:solidFill>
-                <a:schemeClr val="tx1"/>
-              </a:solidFill>
-              <a:effectLst/>
-              <a:latin typeface="+mn-lt"/>
-              <a:ea typeface="+mn-ea"/>
-              <a:cs typeface="+mn-cs"/>
-            </a:endParaRPr>
-          </a:p>
-          <a:p>
-            <a:r>
-              <a:rPr lang="en-US" sz="1200" b="0" i="0" kern="1200" dirty="0">
+              <a:rPr lang="en-US" sz="1000" b="0" i="0" kern="1200" dirty="0">
                 <a:solidFill>
                   <a:schemeClr val="tx1"/>
                 </a:solidFill>
@@ -1734,7 +1590,7 @@
             </a:r>
           </a:p>
           <a:p>
-            <a:endParaRPr lang="en-US" sz="1200" b="0" i="0" kern="1200" dirty="0">
+            <a:endParaRPr lang="en-US" sz="1000" b="0" i="0" kern="1200" dirty="0">
               <a:solidFill>
                 <a:schemeClr val="tx1"/>
               </a:solidFill>
@@ -1746,7 +1602,7 @@
           </a:p>
           <a:p>
             <a:r>
-              <a:rPr lang="en-US" sz="1200" b="0" i="0" kern="1200" dirty="0">
+              <a:rPr lang="en-US" sz="1000" b="0" i="0" kern="1200" dirty="0">
                 <a:solidFill>
                   <a:schemeClr val="tx1"/>
                 </a:solidFill>
@@ -1755,49 +1611,10 @@
                 <a:ea typeface="+mn-ea"/>
                 <a:cs typeface="+mn-cs"/>
               </a:rPr>
-              <a:t>Constructors (of non-final classes) should call only final or private methods. If you decide to ignore this rule and let the constructor call non-final/non-private methods, then:</a:t>
-            </a:r>
-          </a:p>
-          <a:p>
-            <a:endParaRPr lang="en-US" sz="1200" b="0" i="0" kern="1200" dirty="0">
-              <a:solidFill>
-                <a:schemeClr val="tx1"/>
-              </a:solidFill>
-              <a:effectLst/>
-              <a:latin typeface="+mn-lt"/>
-              <a:ea typeface="+mn-ea"/>
-              <a:cs typeface="+mn-cs"/>
-            </a:endParaRPr>
-          </a:p>
-          <a:p>
-            <a:r>
-              <a:rPr lang="en-US" sz="1200" b="0" i="0" kern="1200" dirty="0">
-                <a:solidFill>
-                  <a:schemeClr val="tx1"/>
-                </a:solidFill>
-                <a:effectLst/>
-                <a:latin typeface="+mn-lt"/>
-                <a:ea typeface="+mn-ea"/>
-                <a:cs typeface="+mn-cs"/>
-              </a:rPr>
-              <a:t>those methods and any methods they may call must be careful not to assume the instance is fully initialized, and</a:t>
-            </a:r>
-          </a:p>
-          <a:p>
-            <a:r>
-              <a:rPr lang="en-US" sz="1200" b="0" i="0" kern="1200" dirty="0">
-                <a:solidFill>
-                  <a:schemeClr val="tx1"/>
-                </a:solidFill>
-                <a:effectLst/>
-                <a:latin typeface="+mn-lt"/>
-                <a:ea typeface="+mn-ea"/>
-                <a:cs typeface="+mn-cs"/>
-              </a:rPr>
-              <a:t>the subclasses that override those methods (subclasses that may not even be aware that the superclass constructor is calls those methods) must not assume that the subclass constructor and </a:t>
-            </a:r>
-            <a:r>
-              <a:rPr lang="en-US" sz="1200" b="0" i="0" kern="1200" dirty="0" err="1">
+              <a:t>Constructors (of non-final classes) should call only final or private methods. If you decide to ignore this rule and let the constructor call non-final/non-private methods, then those methods and any methods they may call must be careful not to assume the instance is fully initialized, and the subclasses that override those methods (subclasses that may not even be aware that the superclass constructor is calls those methods) must not assume that the subclass constructor and </a:t>
+            </a:r>
+            <a:r>
+              <a:rPr lang="en-US" sz="1000" b="0" i="0" kern="1200" dirty="0" err="1">
                 <a:solidFill>
                   <a:schemeClr val="tx1"/>
                 </a:solidFill>
@@ -1809,7 +1626,7 @@
               <a:t>superclasses'</a:t>
             </a:r>
             <a:r>
-              <a:rPr lang="en-US" sz="1200" b="0" i="0" kern="1200" dirty="0">
+              <a:rPr lang="en-US" sz="1000" b="0" i="0" kern="1200" dirty="0">
                 <a:solidFill>
                   <a:schemeClr val="tx1"/>
                 </a:solidFill>
@@ -1823,7 +1640,7 @@
           </a:p>
           <a:p>
             <a:r>
-              <a:rPr lang="en-US" sz="1200" b="0" i="0" kern="1200" dirty="0">
+              <a:rPr lang="en-US" sz="1000" b="0" i="0" kern="1200" dirty="0">
                 <a:solidFill>
                   <a:schemeClr val="tx1"/>
                 </a:solidFill>
@@ -1835,7 +1652,7 @@
               <a:t>Is all that extra cognitive baggage worth it? You could allow an exception for simple </a:t>
             </a:r>
             <a:r>
-              <a:rPr lang="en-US" sz="1200" b="0" i="0" kern="1200" dirty="0" err="1">
+              <a:rPr lang="en-US" sz="1000" b="0" i="0" kern="1200" dirty="0" err="1">
                 <a:solidFill>
                   <a:schemeClr val="tx1"/>
                 </a:solidFill>
@@ -1847,7 +1664,7 @@
               <a:t>mutators</a:t>
             </a:r>
             <a:r>
-              <a:rPr lang="en-US" sz="1200" b="0" i="0" kern="1200" dirty="0">
+              <a:rPr lang="en-US" sz="1000" b="0" i="0" kern="1200" dirty="0">
                 <a:solidFill>
                   <a:schemeClr val="tx1"/>
                 </a:solidFill>
@@ -1860,7 +1677,7 @@
             </a:r>
           </a:p>
           <a:p>
-            <a:endParaRPr lang="en-US" sz="1200" b="0" i="0" kern="1200" dirty="0">
+            <a:endParaRPr lang="en-US" sz="1000" b="0" i="0" kern="1200" dirty="0">
               <a:solidFill>
                 <a:schemeClr val="tx1"/>
               </a:solidFill>
@@ -1872,32 +1689,7 @@
           </a:p>
           <a:p>
             <a:r>
-              <a:rPr lang="en-US" sz="1200" b="0" i="0" kern="1200" dirty="0">
-                <a:solidFill>
-                  <a:schemeClr val="tx1"/>
-                </a:solidFill>
-                <a:effectLst/>
-                <a:latin typeface="+mn-lt"/>
-                <a:ea typeface="+mn-ea"/>
-                <a:cs typeface="+mn-cs"/>
-              </a:rPr>
-              <a:t>I rarely do it, and I've never had an issue because of that. It can also have unintended consequences, especially if your setters are overridden in a subclass, or if your setters fire off additional method calls which might not be appropriate during initialization.</a:t>
-            </a:r>
-          </a:p>
-          <a:p>
-            <a:endParaRPr lang="en-US" sz="1200" b="0" i="0" kern="1200" dirty="0">
-              <a:solidFill>
-                <a:schemeClr val="tx1"/>
-              </a:solidFill>
-              <a:effectLst/>
-              <a:latin typeface="+mn-lt"/>
-              <a:ea typeface="+mn-ea"/>
-              <a:cs typeface="+mn-cs"/>
-            </a:endParaRPr>
-          </a:p>
-          <a:p>
-            <a:r>
-              <a:rPr lang="en-US" sz="1200" b="0" i="0" kern="1200" dirty="0">
+              <a:rPr lang="en-US" sz="1000" b="0" i="0" kern="1200" dirty="0">
                 <a:solidFill>
                   <a:schemeClr val="tx1"/>
                 </a:solidFill>
@@ -1910,7 +1702,7 @@
             </a:r>
           </a:p>
           <a:p>
-            <a:endParaRPr lang="en-US" sz="1200" b="0" i="0" kern="1200" dirty="0">
+            <a:endParaRPr lang="en-US" sz="1000" b="0" i="0" kern="1200" dirty="0">
               <a:solidFill>
                 <a:schemeClr val="tx1"/>
               </a:solidFill>
@@ -2002,7 +1794,91 @@
           <a:bodyPr/>
           <a:lstStyle/>
           <a:p>
-            <a:endParaRPr lang="en-US"/>
+            <a:r>
+              <a:rPr lang="en-US" sz="1000" b="0" i="0" kern="1200" dirty="0">
+                <a:solidFill>
+                  <a:schemeClr val="tx1"/>
+                </a:solidFill>
+                <a:effectLst/>
+                <a:latin typeface="+mn-lt"/>
+                <a:ea typeface="+mn-ea"/>
+                <a:cs typeface="+mn-cs"/>
+              </a:rPr>
+              <a:t>Even though the </a:t>
+            </a:r>
+            <a:r>
+              <a:rPr lang="en-US" sz="1000" b="0" i="0" kern="1200" dirty="0" err="1">
+                <a:solidFill>
+                  <a:schemeClr val="tx1"/>
+                </a:solidFill>
+                <a:effectLst/>
+                <a:latin typeface="+mn-lt"/>
+                <a:ea typeface="+mn-ea"/>
+                <a:cs typeface="+mn-cs"/>
+              </a:rPr>
+              <a:t>Git</a:t>
+            </a:r>
+            <a:r>
+              <a:rPr lang="en-US" sz="1000" b="0" i="0" kern="1200" dirty="0">
+                <a:solidFill>
+                  <a:schemeClr val="tx1"/>
+                </a:solidFill>
+                <a:effectLst/>
+                <a:latin typeface="+mn-lt"/>
+                <a:ea typeface="+mn-ea"/>
+                <a:cs typeface="+mn-cs"/>
+              </a:rPr>
+              <a:t> commands can seem a little cryptic at times, it is a tool worth knowing. This type of tool historically would have cost $300 to $500 per developer. Now it’s free… we do live in the golden age. </a:t>
+            </a:r>
+          </a:p>
+          <a:p>
+            <a:endParaRPr lang="en-US" sz="1000" b="0" i="0" kern="1200" dirty="0">
+              <a:solidFill>
+                <a:schemeClr val="tx1"/>
+              </a:solidFill>
+              <a:effectLst/>
+              <a:latin typeface="+mn-lt"/>
+              <a:ea typeface="+mn-ea"/>
+              <a:cs typeface="+mn-cs"/>
+            </a:endParaRPr>
+          </a:p>
+          <a:p>
+            <a:r>
+              <a:rPr lang="en-US" sz="1000" b="0" i="0" kern="1200" dirty="0">
+                <a:solidFill>
+                  <a:schemeClr val="tx1"/>
+                </a:solidFill>
+                <a:effectLst/>
+                <a:latin typeface="+mn-lt"/>
+                <a:ea typeface="+mn-ea"/>
+                <a:cs typeface="+mn-cs"/>
+              </a:rPr>
+              <a:t>I have a couple of  volunteers that I am going to try to work with next week to set up private </a:t>
+            </a:r>
+            <a:r>
+              <a:rPr lang="en-US" sz="1000" b="0" i="0" kern="1200" dirty="0" err="1">
+                <a:solidFill>
+                  <a:schemeClr val="tx1"/>
+                </a:solidFill>
+                <a:effectLst/>
+                <a:latin typeface="+mn-lt"/>
+                <a:ea typeface="+mn-ea"/>
+                <a:cs typeface="+mn-cs"/>
+              </a:rPr>
+              <a:t>Git</a:t>
+            </a:r>
+            <a:r>
+              <a:rPr lang="en-US" sz="1000" b="0" i="0" kern="1200" dirty="0">
+                <a:solidFill>
+                  <a:schemeClr val="tx1"/>
+                </a:solidFill>
+                <a:effectLst/>
+                <a:latin typeface="+mn-lt"/>
+                <a:ea typeface="+mn-ea"/>
+                <a:cs typeface="+mn-cs"/>
+              </a:rPr>
+              <a:t> repositories for homework… more to come later. </a:t>
+            </a:r>
           </a:p>
         </p:txBody>
       </p:sp>
@@ -2024,6 +1900,90 @@
             <a:fld id="{5394DE12-7B9B-46AA-AC19-C30A49928B9B}" type="slidenum">
               <a:rPr lang="en-US" smtClean="0"/>
               <a:t>17</a:t>
+            </a:fld>
+            <a:endParaRPr lang="en-US" dirty="0"/>
+          </a:p>
+        </p:txBody>
+      </p:sp>
+    </p:spTree>
+    <p:extLst>
+      <p:ext uri="{BB962C8B-B14F-4D97-AF65-F5344CB8AC3E}">
+        <p14:creationId xmlns:p14="http://schemas.microsoft.com/office/powerpoint/2010/main" val="3368691648"/>
+      </p:ext>
+    </p:extLst>
+  </p:cSld>
+  <p:clrMapOvr>
+    <a:masterClrMapping/>
+  </p:clrMapOvr>
+</p:notes>
+</file>
+
+<file path=ppt/notesSlides/notesSlide18.xml><?xml version="1.0" encoding="utf-8"?>
+<p:notes xmlns:a="http://schemas.openxmlformats.org/drawingml/2006/main" xmlns:r="http://schemas.openxmlformats.org/officeDocument/2006/relationships" xmlns:p="http://schemas.openxmlformats.org/presentationml/2006/main">
+  <p:cSld>
+    <p:spTree>
+      <p:nvGrpSpPr>
+        <p:cNvPr id="1" name=""/>
+        <p:cNvGrpSpPr/>
+        <p:nvPr/>
+      </p:nvGrpSpPr>
+      <p:grpSpPr>
+        <a:xfrm>
+          <a:off x="0" y="0"/>
+          <a:ext cx="0" cy="0"/>
+          <a:chOff x="0" y="0"/>
+          <a:chExt cx="0" cy="0"/>
+        </a:xfrm>
+      </p:grpSpPr>
+      <p:sp>
+        <p:nvSpPr>
+          <p:cNvPr id="2" name="Slide Image Placeholder 1"/>
+          <p:cNvSpPr>
+            <a:spLocks noGrp="1" noRot="1" noChangeAspect="1"/>
+          </p:cNvSpPr>
+          <p:nvPr>
+            <p:ph type="sldImg"/>
+          </p:nvPr>
+        </p:nvSpPr>
+        <p:spPr/>
+      </p:sp>
+      <p:sp>
+        <p:nvSpPr>
+          <p:cNvPr id="3" name="Notes Placeholder 2"/>
+          <p:cNvSpPr>
+            <a:spLocks noGrp="1"/>
+          </p:cNvSpPr>
+          <p:nvPr>
+            <p:ph type="body" idx="1"/>
+          </p:nvPr>
+        </p:nvSpPr>
+        <p:spPr/>
+        <p:txBody>
+          <a:bodyPr/>
+          <a:lstStyle/>
+          <a:p>
+            <a:endParaRPr lang="en-US"/>
+          </a:p>
+        </p:txBody>
+      </p:sp>
+      <p:sp>
+        <p:nvSpPr>
+          <p:cNvPr id="4" name="Slide Number Placeholder 3"/>
+          <p:cNvSpPr>
+            <a:spLocks noGrp="1"/>
+          </p:cNvSpPr>
+          <p:nvPr>
+            <p:ph type="sldNum" sz="quarter" idx="10"/>
+          </p:nvPr>
+        </p:nvSpPr>
+        <p:spPr/>
+        <p:txBody>
+          <a:bodyPr/>
+          <a:lstStyle/>
+          <a:p>
+            <a:fld id="{5394DE12-7B9B-46AA-AC19-C30A49928B9B}" type="slidenum">
+              <a:rPr lang="en-US" smtClean="0"/>
+              <a:t>18</a:t>
             </a:fld>
             <a:endParaRPr lang="en-US"/>
           </a:p>
@@ -2346,6 +2306,15 @@
           <a:p>
             <a:r>
               <a:rPr lang="en-US" sz="1000" dirty="0"/>
+              <a:t>We will be using a lot of Polymorphism this week; however, it will become “part of the scenery” and not the focus. </a:t>
+            </a:r>
+          </a:p>
+          <a:p>
+            <a:endParaRPr lang="en-US" sz="1000" dirty="0"/>
+          </a:p>
+          <a:p>
+            <a:r>
+              <a:rPr lang="en-US" sz="1000" dirty="0"/>
               <a:t>Example of polymorphism: a for loop that moves through the entries of a list. The list might be of a collection of related kinds of object. We can refer to each of the objects in the list through a generic variable (whose data type matches the one that all are ultimately related to). But, when we invoke a particular function that all members of the family share, each will respond by performing that function in their own specific way. For example, we could have a collection of Shape objects. We could refer to each entry in the Shape list through a generic Shape variable, even though the actual entries in the list are specific kinds of shapes – Circle, Rectangle, etc. All Shape objects might have the ability to calculate their own area. When we refer to an object in the list through a generic Shape variable and tell it to calculate its area, thanks to polymorphism, the circle version of the area() function will be called when we’re dealing with a circle, and the Rectangle version of area() will be called when we’re dealing with a rectangle, etc. </a:t>
             </a:r>
           </a:p>
@@ -2471,6 +2440,15 @@
           <a:p>
             <a:r>
               <a:rPr lang="en-US" sz="1000" dirty="0"/>
+              <a:t>This week lots of work on the Model! Next week we will work on the View.</a:t>
+            </a:r>
+          </a:p>
+          <a:p>
+            <a:endParaRPr lang="en-US" sz="1000" dirty="0"/>
+          </a:p>
+          <a:p>
+            <a:r>
+              <a:rPr lang="en-US" sz="1000" dirty="0"/>
               <a:t>An example would be a system that manages student data. We would want to segregate the Model (data) from the View (UI) for several reasons including that there will likely be many different Views that access the same data including: </a:t>
             </a:r>
           </a:p>
@@ -2650,8 +2628,23 @@
           <a:p>
             <a:r>
               <a:rPr lang="en-US" sz="1000" dirty="0"/>
+              <a:t>Setters… and Getters… and Constructors…. Oh my!</a:t>
+            </a:r>
+          </a:p>
+          <a:p>
+            <a:endParaRPr lang="en-US" sz="1000" dirty="0"/>
+          </a:p>
+          <a:p>
+            <a:r>
+              <a:rPr lang="en-US" sz="1000" dirty="0"/>
               <a:t>Why use Setters &amp; Getters? Because 2 weeks (months, years) from now when you realize that your setter needs to do more than just set the value, you'll also realize that the property has been used directly in 238 other classes. (Internet quote)</a:t>
             </a:r>
+          </a:p>
+          <a:p>
+            <a:endParaRPr lang="en-US" sz="1000" dirty="0"/>
+          </a:p>
+          <a:p>
+            <a:endParaRPr lang="en-US" sz="1000" dirty="0"/>
           </a:p>
         </p:txBody>
       </p:sp>
@@ -3127,7 +3120,7 @@
           <a:p>
             <a:fld id="{969F32F5-AB1C-41B2-AE79-C9DE1D1745A4}" type="datetimeFigureOut">
               <a:rPr lang="en-US" smtClean="0"/>
-              <a:t>3/27/2017</a:t>
+              <a:t>3/28/2017</a:t>
             </a:fld>
             <a:endParaRPr lang="en-US"/>
           </a:p>
@@ -3295,7 +3288,7 @@
           <a:p>
             <a:fld id="{969F32F5-AB1C-41B2-AE79-C9DE1D1745A4}" type="datetimeFigureOut">
               <a:rPr lang="en-US" smtClean="0"/>
-              <a:t>3/27/2017</a:t>
+              <a:t>3/28/2017</a:t>
             </a:fld>
             <a:endParaRPr lang="en-US"/>
           </a:p>
@@ -3473,7 +3466,7 @@
           <a:p>
             <a:fld id="{969F32F5-AB1C-41B2-AE79-C9DE1D1745A4}" type="datetimeFigureOut">
               <a:rPr lang="en-US" smtClean="0"/>
-              <a:t>3/27/2017</a:t>
+              <a:t>3/28/2017</a:t>
             </a:fld>
             <a:endParaRPr lang="en-US"/>
           </a:p>
@@ -3641,7 +3634,7 @@
           <a:p>
             <a:fld id="{969F32F5-AB1C-41B2-AE79-C9DE1D1745A4}" type="datetimeFigureOut">
               <a:rPr lang="en-US" smtClean="0"/>
-              <a:t>3/27/2017</a:t>
+              <a:t>3/28/2017</a:t>
             </a:fld>
             <a:endParaRPr lang="en-US"/>
           </a:p>
@@ -3886,7 +3879,7 @@
           <a:p>
             <a:fld id="{969F32F5-AB1C-41B2-AE79-C9DE1D1745A4}" type="datetimeFigureOut">
               <a:rPr lang="en-US" smtClean="0"/>
-              <a:t>3/27/2017</a:t>
+              <a:t>3/28/2017</a:t>
             </a:fld>
             <a:endParaRPr lang="en-US"/>
           </a:p>
@@ -4115,7 +4108,7 @@
           <a:p>
             <a:fld id="{969F32F5-AB1C-41B2-AE79-C9DE1D1745A4}" type="datetimeFigureOut">
               <a:rPr lang="en-US" smtClean="0"/>
-              <a:t>3/27/2017</a:t>
+              <a:t>3/28/2017</a:t>
             </a:fld>
             <a:endParaRPr lang="en-US"/>
           </a:p>
@@ -4479,7 +4472,7 @@
           <a:p>
             <a:fld id="{969F32F5-AB1C-41B2-AE79-C9DE1D1745A4}" type="datetimeFigureOut">
               <a:rPr lang="en-US" smtClean="0"/>
-              <a:t>3/27/2017</a:t>
+              <a:t>3/28/2017</a:t>
             </a:fld>
             <a:endParaRPr lang="en-US"/>
           </a:p>
@@ -4596,7 +4589,7 @@
           <a:p>
             <a:fld id="{969F32F5-AB1C-41B2-AE79-C9DE1D1745A4}" type="datetimeFigureOut">
               <a:rPr lang="en-US" smtClean="0"/>
-              <a:t>3/27/2017</a:t>
+              <a:t>3/28/2017</a:t>
             </a:fld>
             <a:endParaRPr lang="en-US"/>
           </a:p>
@@ -4691,7 +4684,7 @@
           <a:p>
             <a:fld id="{969F32F5-AB1C-41B2-AE79-C9DE1D1745A4}" type="datetimeFigureOut">
               <a:rPr lang="en-US" smtClean="0"/>
-              <a:t>3/27/2017</a:t>
+              <a:t>3/28/2017</a:t>
             </a:fld>
             <a:endParaRPr lang="en-US"/>
           </a:p>
@@ -4966,7 +4959,7 @@
           <a:p>
             <a:fld id="{969F32F5-AB1C-41B2-AE79-C9DE1D1745A4}" type="datetimeFigureOut">
               <a:rPr lang="en-US" smtClean="0"/>
-              <a:t>3/27/2017</a:t>
+              <a:t>3/28/2017</a:t>
             </a:fld>
             <a:endParaRPr lang="en-US"/>
           </a:p>
@@ -5218,7 +5211,7 @@
           <a:p>
             <a:fld id="{969F32F5-AB1C-41B2-AE79-C9DE1D1745A4}" type="datetimeFigureOut">
               <a:rPr lang="en-US" smtClean="0"/>
-              <a:t>3/27/2017</a:t>
+              <a:t>3/28/2017</a:t>
             </a:fld>
             <a:endParaRPr lang="en-US"/>
           </a:p>
@@ -5429,7 +5422,7 @@
           <a:p>
             <a:fld id="{969F32F5-AB1C-41B2-AE79-C9DE1D1745A4}" type="datetimeFigureOut">
               <a:rPr lang="en-US" smtClean="0"/>
-              <a:t>3/27/2017</a:t>
+              <a:t>3/28/2017</a:t>
             </a:fld>
             <a:endParaRPr lang="en-US"/>
           </a:p>
@@ -5841,13 +5834,13 @@
             <a:spLocks noGrp="1"/>
           </p:cNvSpPr>
           <p:nvPr>
-            <p:ph type="ctrTitle"/>
+            <p:ph type="title"/>
           </p:nvPr>
         </p:nvSpPr>
         <p:spPr>
           <a:xfrm>
-            <a:off x="1524000" y="1122363"/>
-            <a:ext cx="9144000" cy="2387600"/>
+            <a:off x="838200" y="365126"/>
+            <a:ext cx="6113662" cy="1409174"/>
           </a:xfrm>
         </p:spPr>
         <p:txBody>
@@ -5857,52 +5850,184 @@
           <a:lstStyle/>
           <a:p>
             <a:r>
-              <a:rPr lang="en-US" sz="4800" dirty="0"/>
+              <a:rPr lang="en-US" sz="3600" dirty="0"/>
               <a:t>Object-Oriented Programming</a:t>
             </a:r>
-          </a:p>
-        </p:txBody>
-      </p:sp>
-      <p:sp>
-        <p:nvSpPr>
-          <p:cNvPr id="3" name="Subtitle 2"/>
-          <p:cNvSpPr>
-            <a:spLocks noGrp="1"/>
-          </p:cNvSpPr>
-          <p:nvPr>
-            <p:ph type="subTitle" idx="1"/>
+            <a:br>
+              <a:rPr lang="en-US" sz="3600" dirty="0"/>
+            </a:br>
+            <a:r>
+              <a:rPr lang="en-US" sz="1800" dirty="0"/>
+              <a:t>Discussion &amp; Lecture: Week 2 </a:t>
+            </a:r>
+            <a:br>
+              <a:rPr lang="en-US" sz="1800" dirty="0"/>
+            </a:br>
+            <a:r>
+              <a:rPr lang="en-US" sz="1800" dirty="0"/>
+              <a:t>Instructor: Eric Pogue</a:t>
+            </a:r>
+            <a:endParaRPr lang="en-US" sz="1800" b="1" i="1" u="sng" dirty="0"/>
+          </a:p>
+        </p:txBody>
+      </p:sp>
+      <p:sp>
+        <p:nvSpPr>
+          <p:cNvPr id="3" name="Content Placeholder 2"/>
+          <p:cNvSpPr>
+            <a:spLocks noGrp="1"/>
+          </p:cNvSpPr>
+          <p:nvPr>
+            <p:ph idx="1"/>
           </p:nvPr>
         </p:nvSpPr>
         <p:spPr>
           <a:xfrm>
-            <a:off x="1524000" y="3602038"/>
-            <a:ext cx="9144000" cy="2198022"/>
+            <a:off x="838200" y="1943857"/>
+            <a:ext cx="10718950" cy="4571242"/>
           </a:xfrm>
         </p:spPr>
         <p:txBody>
           <a:bodyPr>
-            <a:normAutofit/>
+            <a:noAutofit/>
           </a:bodyPr>
           <a:lstStyle/>
           <a:p>
-            <a:pPr algn="l"/>
-            <a:r>
-              <a:rPr lang="en-US" dirty="0"/>
-              <a:t>Course Number: CPSC-24500</a:t>
-            </a:r>
-          </a:p>
-          <a:p>
-            <a:pPr algn="l"/>
-            <a:r>
-              <a:rPr lang="en-US" dirty="0"/>
-              <a:t>Week: 2 Discussion &amp; Lecture</a:t>
-            </a:r>
-          </a:p>
-          <a:p>
-            <a:pPr algn="l"/>
-            <a:r>
-              <a:rPr lang="en-US" dirty="0"/>
-              <a:t>Instructor: Eric Pogue</a:t>
+            <a:pPr marL="0" indent="0">
+              <a:buNone/>
+            </a:pPr>
+            <a:r>
+              <a:rPr lang="en-US" sz="2000" u="sng" dirty="0"/>
+              <a:t>Agenda – Week 2 Discussion &amp; Lecture (28 Mar 17 at 3pm CST)</a:t>
+            </a:r>
+          </a:p>
+          <a:p>
+            <a:pPr marL="457200" indent="-457200">
+              <a:buFont typeface="+mj-lt"/>
+              <a:buAutoNum type="arabicPeriod"/>
+            </a:pPr>
+            <a:r>
+              <a:rPr lang="en-US" sz="2000" dirty="0"/>
+              <a:t>Friendly Conversation &amp; Good Natured Banter (~5 min)… let’s make sure that everyone can hear and speak in the virtual meeting</a:t>
+            </a:r>
+          </a:p>
+          <a:p>
+            <a:pPr marL="457200" indent="-457200">
+              <a:buFont typeface="+mj-lt"/>
+              <a:buAutoNum type="arabicPeriod"/>
+            </a:pPr>
+            <a:r>
+              <a:rPr lang="en-US" sz="2000" dirty="0"/>
+              <a:t>Week 2 Learning Objectives Review (~5 min)</a:t>
+            </a:r>
+          </a:p>
+          <a:p>
+            <a:pPr marL="457200" indent="-457200">
+              <a:buFont typeface="+mj-lt"/>
+              <a:buAutoNum type="arabicPeriod"/>
+            </a:pPr>
+            <a:r>
+              <a:rPr lang="en-US" sz="2000" dirty="0"/>
+              <a:t>Discussion and Recap of Previously Covered Objectives (~10 min)</a:t>
+            </a:r>
+          </a:p>
+          <a:p>
+            <a:pPr marL="457200" indent="-457200">
+              <a:buFont typeface="+mj-lt"/>
+              <a:buAutoNum type="arabicPeriod"/>
+            </a:pPr>
+            <a:r>
+              <a:rPr lang="en-US" sz="2000" dirty="0"/>
+              <a:t>New Objectives Presentation (~10 min)</a:t>
+            </a:r>
+          </a:p>
+          <a:p>
+            <a:pPr marL="457200" indent="-457200">
+              <a:buFont typeface="+mj-lt"/>
+              <a:buAutoNum type="arabicPeriod"/>
+            </a:pPr>
+            <a:r>
+              <a:rPr lang="en-US" sz="2000" dirty="0"/>
+              <a:t>Bonus Topic: </a:t>
+            </a:r>
+            <a:r>
+              <a:rPr lang="en-US" sz="2000" dirty="0"/>
+              <a:t>Class Source Code, GitHub, and </a:t>
+            </a:r>
+            <a:r>
+              <a:rPr lang="en-US" sz="2000" dirty="0" err="1"/>
+              <a:t>Git</a:t>
+            </a:r>
+            <a:r>
+              <a:rPr lang="en-US" sz="2000" dirty="0"/>
+              <a:t> (~5 min)</a:t>
+            </a:r>
+          </a:p>
+          <a:p>
+            <a:pPr marL="457200" indent="-457200">
+              <a:buFont typeface="+mj-lt"/>
+              <a:buAutoNum type="arabicPeriod"/>
+            </a:pPr>
+            <a:r>
+              <a:rPr lang="en-US" sz="2000" dirty="0"/>
+              <a:t>Updating Shapes App with Setters,  Getters, Constructors, calling “super”, overriding </a:t>
+            </a:r>
+            <a:r>
+              <a:rPr lang="en-US" sz="2000" dirty="0" err="1"/>
+              <a:t>toString</a:t>
+            </a:r>
+            <a:r>
+              <a:rPr lang="en-US" sz="2000" dirty="0"/>
+              <a:t>(), </a:t>
+            </a:r>
+            <a:r>
+              <a:rPr lang="en-US" sz="2000" dirty="0" err="1"/>
+              <a:t>ArrayList</a:t>
+            </a:r>
+            <a:r>
+              <a:rPr lang="en-US" sz="2000" dirty="0"/>
+              <a:t>, Rectangles, Circles, </a:t>
+            </a:r>
+            <a:r>
+              <a:rPr lang="en-US" sz="2000" dirty="0" err="1"/>
+              <a:t>CalcPerimiter</a:t>
+            </a:r>
+            <a:r>
+              <a:rPr lang="en-US" sz="2000" dirty="0"/>
+              <a:t>, and more (~60 min)</a:t>
+            </a:r>
+          </a:p>
+          <a:p>
+            <a:pPr marL="514350" indent="-514350">
+              <a:buFont typeface="+mj-lt"/>
+              <a:buAutoNum type="arabicPeriod"/>
+            </a:pPr>
+            <a:r>
+              <a:rPr lang="en-US" sz="2000" dirty="0"/>
+              <a:t>Wrap-up and Notes (~10 min starting no later than 4:20pm)</a:t>
+            </a:r>
+          </a:p>
+          <a:p>
+            <a:pPr marL="0" indent="0">
+              <a:buNone/>
+            </a:pPr>
+            <a:endParaRPr lang="en-US" sz="2000" dirty="0"/>
+          </a:p>
+          <a:p>
+            <a:pPr marL="0" indent="0">
+              <a:buNone/>
+            </a:pPr>
+            <a:r>
+              <a:rPr lang="en-US" sz="2000" dirty="0"/>
+              <a:t>Questions &amp; Discussion Welcome at </a:t>
+            </a:r>
+            <a:r>
+              <a:rPr lang="en-US" sz="2000" u="sng" dirty="0"/>
+              <a:t>any</a:t>
+            </a:r>
+            <a:r>
+              <a:rPr lang="en-US" sz="2000" dirty="0"/>
+              <a:t> Time</a:t>
             </a:r>
           </a:p>
         </p:txBody>
@@ -5923,7 +6048,7 @@
         </p:blipFill>
         <p:spPr>
           <a:xfrm>
-            <a:off x="8697433" y="376717"/>
+            <a:off x="9072894" y="182925"/>
             <a:ext cx="2656367" cy="1366321"/>
           </a:xfrm>
           <a:prstGeom prst="rect">
@@ -5934,7 +6059,7 @@
     </p:spTree>
     <p:extLst>
       <p:ext uri="{BB962C8B-B14F-4D97-AF65-F5344CB8AC3E}">
-        <p14:creationId xmlns:p14="http://schemas.microsoft.com/office/powerpoint/2010/main" val="3388933671"/>
+        <p14:creationId xmlns:p14="http://schemas.microsoft.com/office/powerpoint/2010/main" val="4063339403"/>
       </p:ext>
     </p:extLst>
   </p:cSld>
@@ -7843,7 +7968,7 @@
             </a:pPr>
             <a:r>
               <a:rPr lang="en-US" sz="2000" dirty="0"/>
-              <a:t>Recognize that some organization that you may work for will ask you not only call private, final, or static methods from a Java constructor</a:t>
+              <a:t>Recognize that some organization that you may work for will ask you to only call private, final, or static methods from a Java constructor</a:t>
             </a:r>
           </a:p>
           <a:p>
@@ -7853,7 +7978,15 @@
             </a:pPr>
             <a:r>
               <a:rPr lang="en-US" sz="2000" dirty="0"/>
-              <a:t>Also recognize that some organizations may ask you not to include “things that could likely fail” in a constructor (database connection initialization, large memory allocations, etc.)</a:t>
+              <a:t>Also recognize that some organizations may ask you </a:t>
+            </a:r>
+            <a:r>
+              <a:rPr lang="en-US" sz="2000" u="sng" dirty="0"/>
+              <a:t>not</a:t>
+            </a:r>
+            <a:r>
+              <a:rPr lang="en-US" sz="2000" dirty="0"/>
+              <a:t> to include “things that could likely fail” in a constructor (database connection initialization, large memory allocations, etc.)</a:t>
             </a:r>
           </a:p>
           <a:p>
@@ -7940,7 +8073,7 @@
           <a:p>
             <a:r>
               <a:rPr lang="en-US" sz="3600" dirty="0"/>
-              <a:t>Clarification: Write default and non-default constructors</a:t>
+              <a:t>Clarification: Writing Constructors</a:t>
             </a:r>
           </a:p>
         </p:txBody>
@@ -7959,6 +8092,307 @@
 </file>
 
 <file path=ppt/slides/slide17.xml><?xml version="1.0" encoding="utf-8"?>
+<p:sld xmlns:a="http://schemas.openxmlformats.org/drawingml/2006/main" xmlns:r="http://schemas.openxmlformats.org/officeDocument/2006/relationships" xmlns:p="http://schemas.openxmlformats.org/presentationml/2006/main">
+  <p:cSld>
+    <p:spTree>
+      <p:nvGrpSpPr>
+        <p:cNvPr id="1" name=""/>
+        <p:cNvGrpSpPr/>
+        <p:nvPr/>
+      </p:nvGrpSpPr>
+      <p:grpSpPr>
+        <a:xfrm>
+          <a:off x="0" y="0"/>
+          <a:ext cx="0" cy="0"/>
+          <a:chOff x="0" y="0"/>
+          <a:chExt cx="0" cy="0"/>
+        </a:xfrm>
+      </p:grpSpPr>
+      <p:sp>
+        <p:nvSpPr>
+          <p:cNvPr id="4" name="Content Placeholder 2"/>
+          <p:cNvSpPr>
+            <a:spLocks noGrp="1"/>
+          </p:cNvSpPr>
+          <p:nvPr>
+            <p:ph idx="1"/>
+          </p:nvPr>
+        </p:nvSpPr>
+        <p:spPr>
+          <a:xfrm>
+            <a:off x="838200" y="1156731"/>
+            <a:ext cx="10709820" cy="5101487"/>
+          </a:xfrm>
+        </p:spPr>
+        <p:txBody>
+          <a:bodyPr>
+            <a:normAutofit lnSpcReduction="10000"/>
+          </a:bodyPr>
+          <a:lstStyle/>
+          <a:p>
+            <a:pPr>
+              <a:buFont typeface="Wingdings" panose="05000000000000000000" pitchFamily="2" charset="2"/>
+              <a:buChar char="§"/>
+            </a:pPr>
+            <a:r>
+              <a:rPr lang="en-US" sz="2000" dirty="0"/>
+              <a:t>Configuration Management is a CRITICAL part of software development that is (regrettably) sorely lacking in nearly all new college graduates</a:t>
+            </a:r>
+          </a:p>
+          <a:p>
+            <a:pPr>
+              <a:buFont typeface="Wingdings" panose="05000000000000000000" pitchFamily="2" charset="2"/>
+              <a:buChar char="§"/>
+            </a:pPr>
+            <a:r>
+              <a:rPr lang="en-US" sz="2000" dirty="0"/>
+              <a:t>ALL experienced capable software development professionals  have a solid understanding of how Configuration Management works… my personal favorite developer interview question is:</a:t>
+            </a:r>
+          </a:p>
+          <a:p>
+            <a:pPr marL="457200" lvl="1" indent="0">
+              <a:buNone/>
+            </a:pPr>
+            <a:r>
+              <a:rPr lang="en-US" sz="2000" dirty="0"/>
+              <a:t>“How did you handle configuration management and source code control on your last project? What worked and what would you do differently the next time.”</a:t>
+            </a:r>
+          </a:p>
+          <a:p>
+            <a:pPr>
+              <a:buFont typeface="Wingdings" panose="05000000000000000000" pitchFamily="2" charset="2"/>
+              <a:buChar char="§"/>
+            </a:pPr>
+            <a:r>
+              <a:rPr lang="en-US" sz="2000" dirty="0"/>
+              <a:t>Source code control is the most fundamental part of configuration management</a:t>
+            </a:r>
+          </a:p>
+          <a:p>
+            <a:pPr>
+              <a:buFont typeface="Wingdings" panose="05000000000000000000" pitchFamily="2" charset="2"/>
+              <a:buChar char="§"/>
+            </a:pPr>
+            <a:r>
+              <a:rPr lang="en-US" sz="2000" dirty="0" err="1"/>
+              <a:t>Git</a:t>
+            </a:r>
+            <a:r>
+              <a:rPr lang="en-US" sz="2000" dirty="0"/>
+              <a:t> is the most popular source code control system… and it works GREAT</a:t>
+            </a:r>
+          </a:p>
+          <a:p>
+            <a:pPr>
+              <a:buFont typeface="Wingdings" panose="05000000000000000000" pitchFamily="2" charset="2"/>
+              <a:buChar char="§"/>
+            </a:pPr>
+            <a:r>
+              <a:rPr lang="en-US" sz="2000" dirty="0"/>
+              <a:t>GitHub is the most popular hosting site for </a:t>
+            </a:r>
+            <a:r>
+              <a:rPr lang="en-US" sz="2000" dirty="0" err="1"/>
+              <a:t>Git</a:t>
+            </a:r>
+            <a:endParaRPr lang="en-US" sz="2000" dirty="0"/>
+          </a:p>
+          <a:p>
+            <a:pPr>
+              <a:buFont typeface="Wingdings" panose="05000000000000000000" pitchFamily="2" charset="2"/>
+              <a:buChar char="§"/>
+            </a:pPr>
+            <a:endParaRPr lang="en-US" sz="2000" dirty="0"/>
+          </a:p>
+          <a:p>
+            <a:pPr marL="0" indent="0">
+              <a:buNone/>
+            </a:pPr>
+            <a:r>
+              <a:rPr lang="en-US" sz="2000" dirty="0"/>
+              <a:t>And the source code for this class is available through your web browser at: </a:t>
+            </a:r>
+          </a:p>
+          <a:p>
+            <a:pPr marL="0" indent="0">
+              <a:buNone/>
+            </a:pPr>
+            <a:r>
+              <a:rPr lang="en-US" sz="2000" dirty="0">
+                <a:hlinkClick r:id="rId3"/>
+              </a:rPr>
+              <a:t>https://github.com/EricJPogue/CPSC-24500</a:t>
+            </a:r>
+            <a:endParaRPr lang="en-US" sz="2000" dirty="0"/>
+          </a:p>
+          <a:p>
+            <a:pPr marL="0" indent="0">
+              <a:buNone/>
+            </a:pPr>
+            <a:r>
+              <a:rPr lang="en-US" sz="2000" b="1" i="1" u="sng" dirty="0"/>
+              <a:t>Or</a:t>
+            </a:r>
+            <a:r>
+              <a:rPr lang="en-US" sz="2000" dirty="0"/>
+              <a:t> using the </a:t>
+            </a:r>
+            <a:r>
+              <a:rPr lang="en-US" sz="2000" dirty="0" err="1"/>
+              <a:t>Git</a:t>
+            </a:r>
+            <a:r>
+              <a:rPr lang="en-US" sz="2000" dirty="0"/>
+              <a:t> client execute the following command to get all of the classes source code:</a:t>
+            </a:r>
+          </a:p>
+          <a:p>
+            <a:pPr marL="0" indent="0">
+              <a:buNone/>
+            </a:pPr>
+            <a:r>
+              <a:rPr lang="en-US" sz="2000" dirty="0"/>
+              <a:t>“</a:t>
+            </a:r>
+            <a:r>
+              <a:rPr lang="en-US" sz="2000" dirty="0" err="1"/>
+              <a:t>git</a:t>
+            </a:r>
+            <a:r>
+              <a:rPr lang="en-US" sz="2000" dirty="0"/>
+              <a:t> clone https://github.com/</a:t>
+            </a:r>
+            <a:r>
+              <a:rPr lang="en-US" sz="2000" dirty="0" err="1"/>
+              <a:t>EricJPogue</a:t>
+            </a:r>
+            <a:r>
+              <a:rPr lang="en-US" sz="2000" dirty="0"/>
+              <a:t>/CPSC-24500.git”</a:t>
+            </a:r>
+          </a:p>
+          <a:p>
+            <a:pPr>
+              <a:buFont typeface="Wingdings" panose="05000000000000000000" pitchFamily="2" charset="2"/>
+              <a:buChar char="§"/>
+            </a:pPr>
+            <a:endParaRPr lang="en-US" sz="2000" dirty="0"/>
+          </a:p>
+          <a:p>
+            <a:pPr>
+              <a:buFont typeface="Wingdings" panose="05000000000000000000" pitchFamily="2" charset="2"/>
+              <a:buChar char="§"/>
+            </a:pPr>
+            <a:endParaRPr lang="en-US" sz="2000" dirty="0"/>
+          </a:p>
+          <a:p>
+            <a:pPr>
+              <a:buFont typeface="Wingdings" panose="05000000000000000000" pitchFamily="2" charset="2"/>
+              <a:buChar char="§"/>
+            </a:pPr>
+            <a:endParaRPr lang="en-US" sz="2000" dirty="0"/>
+          </a:p>
+          <a:p>
+            <a:pPr marL="0" indent="0">
+              <a:buNone/>
+            </a:pPr>
+            <a:endParaRPr lang="en-US" sz="2000" dirty="0"/>
+          </a:p>
+        </p:txBody>
+      </p:sp>
+      <p:sp>
+        <p:nvSpPr>
+          <p:cNvPr id="5" name="Title 1"/>
+          <p:cNvSpPr txBox="1">
+            <a:spLocks/>
+          </p:cNvSpPr>
+          <p:nvPr/>
+        </p:nvSpPr>
+        <p:spPr>
+          <a:xfrm>
+            <a:off x="990600" y="517526"/>
+            <a:ext cx="10515600" cy="757272"/>
+          </a:xfrm>
+          <a:prstGeom prst="rect">
+            <a:avLst/>
+          </a:prstGeom>
+        </p:spPr>
+        <p:txBody>
+          <a:bodyPr vert="horz" lIns="91440" tIns="45720" rIns="91440" bIns="45720" rtlCol="0" anchor="ctr">
+            <a:normAutofit/>
+          </a:bodyPr>
+          <a:lstStyle>
+            <a:lvl1pPr algn="l" defTabSz="914400" rtl="0" eaLnBrk="1" latinLnBrk="0" hangingPunct="1">
+              <a:lnSpc>
+                <a:spcPct val="90000"/>
+              </a:lnSpc>
+              <a:spcBef>
+                <a:spcPct val="0"/>
+              </a:spcBef>
+              <a:buNone/>
+              <a:defRPr sz="4400" kern="1200">
+                <a:solidFill>
+                  <a:schemeClr val="tx1"/>
+                </a:solidFill>
+                <a:latin typeface="+mj-lt"/>
+                <a:ea typeface="+mj-ea"/>
+                <a:cs typeface="+mj-cs"/>
+              </a:defRPr>
+            </a:lvl1pPr>
+          </a:lstStyle>
+          <a:p>
+            <a:endParaRPr lang="en-US" sz="3600" dirty="0"/>
+          </a:p>
+        </p:txBody>
+      </p:sp>
+      <p:sp>
+        <p:nvSpPr>
+          <p:cNvPr id="6" name="Title 1"/>
+          <p:cNvSpPr>
+            <a:spLocks noGrp="1"/>
+          </p:cNvSpPr>
+          <p:nvPr>
+            <p:ph type="title"/>
+          </p:nvPr>
+        </p:nvSpPr>
+        <p:spPr>
+          <a:xfrm>
+            <a:off x="838200" y="365126"/>
+            <a:ext cx="10515600" cy="757272"/>
+          </a:xfrm>
+        </p:spPr>
+        <p:txBody>
+          <a:bodyPr>
+            <a:normAutofit/>
+          </a:bodyPr>
+          <a:lstStyle/>
+          <a:p>
+            <a:r>
+              <a:rPr lang="en-US" sz="3600" dirty="0"/>
+              <a:t>Bonus Topic: Class Source Code, GitHub, and </a:t>
+            </a:r>
+            <a:r>
+              <a:rPr lang="en-US" sz="3600" dirty="0" err="1"/>
+              <a:t>Git</a:t>
+            </a:r>
+            <a:endParaRPr lang="en-US" sz="3600" dirty="0"/>
+          </a:p>
+        </p:txBody>
+      </p:sp>
+    </p:spTree>
+    <p:extLst>
+      <p:ext uri="{BB962C8B-B14F-4D97-AF65-F5344CB8AC3E}">
+        <p14:creationId xmlns:p14="http://schemas.microsoft.com/office/powerpoint/2010/main" val="3093316374"/>
+      </p:ext>
+    </p:extLst>
+  </p:cSld>
+  <p:clrMapOvr>
+    <a:masterClrMapping/>
+  </p:clrMapOvr>
+</p:sld>
+</file>
+
+<file path=ppt/slides/slide18.xml><?xml version="1.0" encoding="utf-8"?>
 <p:sld xmlns:a="http://schemas.openxmlformats.org/drawingml/2006/main" xmlns:r="http://schemas.openxmlformats.org/officeDocument/2006/relationships" xmlns:p="http://schemas.openxmlformats.org/presentationml/2006/main">
   <p:cSld>
     <p:spTree>
@@ -11375,14 +11809,14 @@
 <file path=customXml/itemProps2.xml><?xml version="1.0" encoding="utf-8"?>
 <ds:datastoreItem xmlns:ds="http://schemas.openxmlformats.org/officeDocument/2006/customXml" ds:itemID="{3473EA1A-2744-48E8-B2A3-4F89C0FC849C}">
   <ds:schemaRefs>
+    <ds:schemaRef ds:uri="http://schemas.microsoft.com/office/2006/metadata/properties"/>
+    <ds:schemaRef ds:uri="http://purl.org/dc/terms/"/>
+    <ds:schemaRef ds:uri="http://schemas.openxmlformats.org/package/2006/metadata/core-properties"/>
     <ds:schemaRef ds:uri="http://schemas.microsoft.com/office/2006/documentManagement/types"/>
-    <ds:schemaRef ds:uri="http://schemas.openxmlformats.org/package/2006/metadata/core-properties"/>
-    <ds:schemaRef ds:uri="http://purl.org/dc/dcmitype/"/>
     <ds:schemaRef ds:uri="http://schemas.microsoft.com/office/infopath/2007/PartnerControls"/>
     <ds:schemaRef ds:uri="http://purl.org/dc/elements/1.1/"/>
-    <ds:schemaRef ds:uri="http://schemas.microsoft.com/office/2006/metadata/properties"/>
     <ds:schemaRef ds:uri="http://www.w3.org/XML/1998/namespace"/>
-    <ds:schemaRef ds:uri="http://purl.org/dc/terms/"/>
+    <ds:schemaRef ds:uri="http://purl.org/dc/dcmitype/"/>
   </ds:schemaRefs>
 </ds:datastoreItem>
 </file>

</xml_diff>